<commit_message>
changed pictures, restructured HMTL, changed styling
</commit_message>
<xml_diff>
--- a/Wireframe.pptx
+++ b/Wireframe.pptx
@@ -4,6 +4,9 @@
   <p:sldMasterIdLst>
     <p:sldMasterId id="2147483660" r:id="rId1"/>
   </p:sldMasterIdLst>
+  <p:notesMasterIdLst>
+    <p:notesMasterId r:id="rId3"/>
+  </p:notesMasterIdLst>
   <p:sldIdLst>
     <p:sldId id="256" r:id="rId2"/>
   </p:sldIdLst>
@@ -104,7 +107,499 @@
       </a:defRPr>
     </a:lvl9pPr>
   </p:defaultTextStyle>
+  <p:extLst>
+    <p:ext uri="{EFAFB233-063F-42B5-8137-9DF3F51BA10A}">
+      <p15:sldGuideLst xmlns:p15="http://schemas.microsoft.com/office/powerpoint/2012/main"/>
+    </p:ext>
+  </p:extLst>
 </p:presentation>
+</file>
+
+<file path=ppt/ink/ink1.xml><?xml version="1.0" encoding="utf-8"?>
+<inkml:ink xmlns:inkml="http://www.w3.org/2003/InkML">
+  <inkml:definitions>
+    <inkml:context xml:id="ctx0">
+      <inkml:inkSource xml:id="inkSrc0">
+        <inkml:traceFormat>
+          <inkml:channel name="X" type="integer" min="-2.14748E9" max="2.14748E9" units="cm"/>
+          <inkml:channel name="Y" type="integer" min="-2.14748E9" max="2.14748E9" units="cm"/>
+          <inkml:channel name="F" type="integer" max="32767" units="dev"/>
+        </inkml:traceFormat>
+        <inkml:channelProperties>
+          <inkml:channelProperty channel="X" name="resolution" value="1000" units="1/cm"/>
+          <inkml:channelProperty channel="Y" name="resolution" value="1000" units="1/cm"/>
+          <inkml:channelProperty channel="F" name="resolution" value="0" units="1/dev"/>
+        </inkml:channelProperties>
+      </inkml:inkSource>
+      <inkml:timestamp xml:id="ts0" timeString="2024-03-13T00:11:35.085"/>
+    </inkml:context>
+    <inkml:brush xml:id="br0">
+      <inkml:brushProperty name="width" value="0.1" units="cm"/>
+      <inkml:brushProperty name="height" value="0.1" units="cm"/>
+    </inkml:brush>
+  </inkml:definitions>
+  <inkml:trace contextRef="#ctx0" brushRef="#br0">189 0 24575,'-8'94'0,"1"-1"0,-1 1 0,0-1 0,1 1 0,-1-1 0,0 1 0,1-1 0,-1 1 0,0-1 0,1 1 0,-1 0 0,3-19 0,-3 19 0,2-19 0,-2 22 0,-2 15 0,-1 9 0,0 4 0,1-3 0,0-8 0,2-15 0,2-20 0,2-28 0,5-31 0,0-21 0</inkml:trace>
+</inkml:ink>
+</file>
+
+<file path=ppt/ink/ink2.xml><?xml version="1.0" encoding="utf-8"?>
+<inkml:ink xmlns:inkml="http://www.w3.org/2003/InkML">
+  <inkml:definitions>
+    <inkml:context xml:id="ctx0">
+      <inkml:inkSource xml:id="inkSrc0">
+        <inkml:traceFormat>
+          <inkml:channel name="X" type="integer" min="-2.14748E9" max="2.14748E9" units="cm"/>
+          <inkml:channel name="Y" type="integer" min="-2.14748E9" max="2.14748E9" units="cm"/>
+          <inkml:channel name="F" type="integer" max="32767" units="dev"/>
+        </inkml:traceFormat>
+        <inkml:channelProperties>
+          <inkml:channelProperty channel="X" name="resolution" value="1000" units="1/cm"/>
+          <inkml:channelProperty channel="Y" name="resolution" value="1000" units="1/cm"/>
+          <inkml:channelProperty channel="F" name="resolution" value="0" units="1/dev"/>
+        </inkml:channelProperties>
+      </inkml:inkSource>
+      <inkml:timestamp xml:id="ts0" timeString="2024-03-13T00:11:50.781"/>
+    </inkml:context>
+    <inkml:brush xml:id="br0">
+      <inkml:brushProperty name="width" value="0.1" units="cm"/>
+      <inkml:brushProperty name="height" value="0.1" units="cm"/>
+    </inkml:brush>
+  </inkml:definitions>
+  <inkml:trace contextRef="#ctx0" brushRef="#br0">203 144 24575,'63'-3'0,"0"0"0,27 2 0,9 2-1451,-20-1 1,4 0 0,8 1 1450,-9 2 0,8 0 0,3 0 0,1 1 0,-3 0-1150,-7 1 0,-2-1 0,0 1 0,1 0 0,1 0 1150,10 0 0,2 0 0,1 0 0,-1 1 0,0 1 0,-3 2 0,1 1 0,-2 1 0,-1 0 0,-5-2 0,0-1 0,-5-1 0,0 0 0,4 1-145,-1 1 0,4 1 0,1 0 0,-2 1 0,-4-2 145,0 0 0,-4-1 0,-1 0 0,-1 0 0,23 2 0,-1-1 0,0 0 0,-24-3 0,1 0 0,-1 0 0,-2 0 0,10 1 0,-2 1 0,3-1-572,13 0 1,3 0 0,-2 0 571,-11 1 0,-1 1 0,-3-2 0,-8-2 0,-2-2 0,3 1 0,9 2 0,3 0 0,-4-1 0,13-2 0,2 1 0,-26 2 0,6 3 0,1-1 0,-3-1 0,14-3 0,-2-2 0,-1 1 0,-2 4 0,0 1 0,2-1 0,-12-6 0,4-1 0,-1 0 0,-5 0 0,3 1 0,-3 1 0,2-1 0,19 1 0,5 0 0,-5 0 0,-16-2 0,-3 0 0,1 1 0,5 1 0,1 0 0,-1-1 61,-6 0 0,0-1 0,-3-1-61,27 1 0,-2 0 0,-24 0 0,0 0 0,-4 0 0,11 0 0,-2 0 0,14 0 0,-1 0 0,-15 0 0,-1 0 0,10 0 0,-3 0 1781,-26 0 0,-1 0-1781,17 1 0,1-2 0,-9-1 0,-2 0 0,-7 1 0,0 1 0,4-3 0,-8 1 3203,-14 2-3203,17-6 0,34-18 0,-29 7 0,-1 0 0,-4 0 0,-17 7 3214,27-14-3214,-16 9 1838,16-10-1838,-5 3 0,4 1 0,-3 0 540,-9 3-540,15-6 0,20 2 0,-25 3 0,20 1 0,-31 10 0,43-2-770,-5 5 770,-33 3 0,1 0 0,1 2 0,1 0 0,0-2 0,2-1 0,1 3 0,1-1 0,15-1 0,0 0-729,-18 2 0,0 0 729,17 0 0,1 0 0,-4 0 0,-1 0 0,1 0 0,2 0 0,9 0 0,0 0 0,-8 0 0,-1 0 0,5-2 0,0 0 0,0-1 0,0 0 0,-7-1 0,-2-2 0,-3 2 0,0-1 0,3 1 0,-2-1 0,-13-2 0,-2 1 0,3 2 0,1-2-191,9-4 0,-2-2 191,-15 5 0,-1 0 0,7-3 0,1-2 0,12 1 0,-5 0 0,12-3 0,1 2 0,-4 1 0,-16 3 0,3 2 0,2-1 0,4 0 0,22-1 0,-14 0 0,-26 4 0,-1-2 698,2 6-698,-15-3 0,30 3 0,-20 0 0,48 0 0,-17 0 0,5 0 0,13 0 0,-30 0 0,-12 0 0,-1 0 0,13 3 0,30 5 0,-42 0 0,32 10 1484,-27-6-1484,-1 5 428,28 6-428,-18-3 0,26 8 0,-21-6 0,-20-8 0,2 1-525,37 22 525,1-10 0,0-1 0,-41-7 0,-2-1 0,19 0 0,-4-4-40,-1-4 40,-12-3 0,2 0 0,45 7-358,-36-4 1,-1-1 357,26 2 0,-37-7 0,-12 0 505,-28-4-505,-5 0 40,1 2-40,-3 8 735,2-4-735,-1 11 0,6 20 0,-5-2 0,4 4 0,-7-32 0,1 29 0,-2 0 0,0 19 0,0 7 0,0 33 0,0-36 0,0 0 0,0 40 0,-4-9 0,0-10 0,-3-3 0,3-44 0,1 46 0,-1-40 0,4 28 0,-3-37 0,5-13 0,-2-17 0,0 0 0,-4-2 0,1 4 0,-1 8 0,2 1 0,-1 4 0,-2-3 0,-2 3 0,-2 1 0,-4 9 0,-17 34 0,-8-3 0,-7 19 0,-18 1 0,9-8 0,-6-2 0,-2 3 0,19-29 0,3 2 0,16-23 0,11-1 0,5-8 0,1 3 0,2 1 0,3-6 0,-3 1 0,1-2 0,1 2 0,-4 4 0,7 2 0,-5 0 0,5 3 0,-5 4 0,4-2 0,-4 1 0,2-6 0,-2 6 0,-2 39 0,-1 35 0,-1-15 0,-2 7-1124,1 5 1,-2 2 1123,-1-2 0,-1 1 0,2-25 0,-1 1 0,2-7 0,3-10 0,0-3-233,-8 21 1,2-10 232,9-29 0,-5 11 0,8-29 0,-1-5 0,-1-4 2189,-6-11-2189,2 1 523,-2-7-523,1 4 0,-5-4 0,1 2 0,-10-5 0,4 4 0,-10-5 0,-1 2 0,-19-8 0,-3 2 0,-35-13 0,7 8 0,-13 1 0,12 7 0,5 10 0,5-3 0,14 4 0,-10-4 0,18 1 0,-20-8 0,18 6 0,-17-5 0,6 6 0,-5-1 0,-11 1 0,15 1 0,-4 5 0,0-8 0,-18 7 0,4-5 0,29 8 0,0 1 0,-30-5 0,30 6 0,-1 1 0,-33-3 0,35 2 0,-2 2-587,-6-1 0,-1 0 587,0 0 0,-1 0 0,-16 0 0,-1 0 0,8-2 0,0 0 0,-2 1 0,3 0 0,13-1 0,0 0 0,-14 2 0,-1 0 0,15 0 0,-1 0 0,-20 0 0,-1 0-296,13 1 0,0-2 296,-7-2 0,0-2 0,5 0 0,-1-1-803,-10-4 0,0 1 803,1 3 0,2 1 0,7-2 0,0 1-202,-5 5 0,3 1 202,17-2 0,0 0 0,-19 2 0,1 0 0,-22 0-177,20-2 1,-2 0 176,17 1 0,1 1 0,-16-3 0,-3 1 0,-4 2 0,0 0 0,10 0 0,0 0 0,-14 0 0,-1 0 0,14 0 0,0 0 0,-5 0 0,-3 0 0,-9 0 0,-3 0-1074,-2 0 0,0 0 1074,0 0 0,1 0 0,2 2 0,3 0-13,15 1 1,2 0 12,-7 2 0,-1-1 0,7-1 0,0 0 0,-3-1 0,0 0 0,0-2 0,1 0 0,1 2 0,1 0-145,2-1 1,3-1 144,11 2 0,1 0 0,-10-1 0,0-2 0,13 1 0,1 0 0,-7 0 0,-1 0 0,-3 0 0,1 0 0,1 0 0,-1 0 0,-5 2 0,0 0 0,4-1 0,1-1 0,-1 2 0,0 0 0,3 0 0,-1 0 0,-14-2 0,-2 1 0,4 3 0,0 0-27,-6-3 0,-1 0 27,-3 3 0,-1 0 0,2-3 0,0 0 0,-2 1 0,0 0 0,6-2 0,-2 0 293,-20 3 0,-1-1-293,16-1 0,-2 0 0,3 0 0,-5 2 0,5-2 0,-6-1 0,1 0 0,10 0 0,-3 0 0,2 0 0,10 0 0,2 0 0,-2 0 0,-11 0 0,-4 0 0,4 0 0,-16 0 0,-1 0 0,13 0 0,-3 0 0,5 0 0,-8 0 0,3 0 0,19 0 0,0 0 0,0 0 0,-23-2 0,4 0 0,22 1 0,2 0 540,-1-2 1,0-2-541,4 3 0,2-1 0,-37-5 0,6 0 0,6 1 0,-7-5 0,1 6 0,33-2 0,0 1 0,-22 5 0,19-6 0,0 0 0,-27-1 0,12 2 0,-1-1 0,23 0 0,1 1 0,-7 2 0,-2 0 0,-1-3 0,-1-1 0,6 3 0,-2-2 0,-16-3 0,-1-1 0,12 1 0,-1-1-73,-13-4 0,3-1 73,-23-5 0,22 2 0,1-1 0,-17-5 0,36 9 0,0-1 0,-20-8 1350,13 5-1350,2-3 2330,8 3-2330,1-2 368,12 4-368,-5 0 1076,0-3-1076,0-1 0,-2-1 0,7 5 0,-3 1 0,-14 0 0,2 1 0,-25-2 0,27 9 0,-25-5 0,31 8 0,-4-1 0,6 3 0,19 4 0,-5-2 0,8 1 0,-9 1 0,-5 1 0,-19 1 0,7 5 0,-21-2 0,10 6 0,-16-5 0,8 5 0,12-7 0,9 1 0,25-2 0,4-2 0,11 0 0,3 0 0</inkml:trace>
+</inkml:ink>
+</file>
+
+<file path=ppt/notesMasters/notesMaster1.xml><?xml version="1.0" encoding="utf-8"?>
+<p:notesMaster xmlns:a="http://schemas.openxmlformats.org/drawingml/2006/main" xmlns:r="http://schemas.openxmlformats.org/officeDocument/2006/relationships" xmlns:p="http://schemas.openxmlformats.org/presentationml/2006/main">
+  <p:cSld>
+    <p:bg>
+      <p:bgRef idx="1001">
+        <a:schemeClr val="bg1"/>
+      </p:bgRef>
+    </p:bg>
+    <p:spTree>
+      <p:nvGrpSpPr>
+        <p:cNvPr id="1" name=""/>
+        <p:cNvGrpSpPr/>
+        <p:nvPr/>
+      </p:nvGrpSpPr>
+      <p:grpSpPr>
+        <a:xfrm>
+          <a:off x="0" y="0"/>
+          <a:ext cx="0" cy="0"/>
+          <a:chOff x="0" y="0"/>
+          <a:chExt cx="0" cy="0"/>
+        </a:xfrm>
+      </p:grpSpPr>
+      <p:sp>
+        <p:nvSpPr>
+          <p:cNvPr id="2" name="Header Placeholder 1"/>
+          <p:cNvSpPr>
+            <a:spLocks noGrp="1"/>
+          </p:cNvSpPr>
+          <p:nvPr>
+            <p:ph type="hdr" sz="quarter"/>
+          </p:nvPr>
+        </p:nvSpPr>
+        <p:spPr>
+          <a:xfrm>
+            <a:off x="0" y="0"/>
+            <a:ext cx="2971800" cy="458788"/>
+          </a:xfrm>
+          <a:prstGeom prst="rect">
+            <a:avLst/>
+          </a:prstGeom>
+        </p:spPr>
+        <p:txBody>
+          <a:bodyPr vert="horz" lIns="91440" tIns="45720" rIns="91440" bIns="45720" rtlCol="0"/>
+          <a:lstStyle>
+            <a:lvl1pPr algn="l">
+              <a:defRPr sz="1200"/>
+            </a:lvl1pPr>
+          </a:lstStyle>
+          <a:p>
+            <a:endParaRPr lang="en-US"/>
+          </a:p>
+        </p:txBody>
+      </p:sp>
+      <p:sp>
+        <p:nvSpPr>
+          <p:cNvPr id="3" name="Date Placeholder 2"/>
+          <p:cNvSpPr>
+            <a:spLocks noGrp="1"/>
+          </p:cNvSpPr>
+          <p:nvPr>
+            <p:ph type="dt" idx="1"/>
+          </p:nvPr>
+        </p:nvSpPr>
+        <p:spPr>
+          <a:xfrm>
+            <a:off x="3884613" y="0"/>
+            <a:ext cx="2971800" cy="458788"/>
+          </a:xfrm>
+          <a:prstGeom prst="rect">
+            <a:avLst/>
+          </a:prstGeom>
+        </p:spPr>
+        <p:txBody>
+          <a:bodyPr vert="horz" lIns="91440" tIns="45720" rIns="91440" bIns="45720" rtlCol="0"/>
+          <a:lstStyle>
+            <a:lvl1pPr algn="r">
+              <a:defRPr sz="1200"/>
+            </a:lvl1pPr>
+          </a:lstStyle>
+          <a:p>
+            <a:fld id="{14F59EAE-7192-4644-902B-FDE1AFA014CA}" type="datetimeFigureOut">
+              <a:rPr lang="en-US" smtClean="0"/>
+              <a:t>3/12/24</a:t>
+            </a:fld>
+            <a:endParaRPr lang="en-US"/>
+          </a:p>
+        </p:txBody>
+      </p:sp>
+      <p:sp>
+        <p:nvSpPr>
+          <p:cNvPr id="4" name="Slide Image Placeholder 3"/>
+          <p:cNvSpPr>
+            <a:spLocks noGrp="1" noRot="1" noChangeAspect="1"/>
+          </p:cNvSpPr>
+          <p:nvPr>
+            <p:ph type="sldImg" idx="2"/>
+          </p:nvPr>
+        </p:nvSpPr>
+        <p:spPr>
+          <a:xfrm>
+            <a:off x="2560638" y="1143000"/>
+            <a:ext cx="1736725" cy="3086100"/>
+          </a:xfrm>
+          <a:prstGeom prst="rect">
+            <a:avLst/>
+          </a:prstGeom>
+          <a:noFill/>
+          <a:ln w="12700">
+            <a:solidFill>
+              <a:prstClr val="black"/>
+            </a:solidFill>
+          </a:ln>
+        </p:spPr>
+        <p:txBody>
+          <a:bodyPr vert="horz" lIns="91440" tIns="45720" rIns="91440" bIns="45720" rtlCol="0" anchor="ctr"/>
+          <a:lstStyle/>
+          <a:p>
+            <a:endParaRPr lang="en-US"/>
+          </a:p>
+        </p:txBody>
+      </p:sp>
+      <p:sp>
+        <p:nvSpPr>
+          <p:cNvPr id="5" name="Notes Placeholder 4"/>
+          <p:cNvSpPr>
+            <a:spLocks noGrp="1"/>
+          </p:cNvSpPr>
+          <p:nvPr>
+            <p:ph type="body" sz="quarter" idx="3"/>
+          </p:nvPr>
+        </p:nvSpPr>
+        <p:spPr>
+          <a:xfrm>
+            <a:off x="685800" y="4400550"/>
+            <a:ext cx="5486400" cy="3600450"/>
+          </a:xfrm>
+          <a:prstGeom prst="rect">
+            <a:avLst/>
+          </a:prstGeom>
+        </p:spPr>
+        <p:txBody>
+          <a:bodyPr vert="horz" lIns="91440" tIns="45720" rIns="91440" bIns="45720" rtlCol="0"/>
+          <a:lstStyle/>
+          <a:p>
+            <a:pPr lvl="0"/>
+            <a:r>
+              <a:rPr lang="en-US"/>
+              <a:t>Click to edit Master text styles</a:t>
+            </a:r>
+          </a:p>
+          <a:p>
+            <a:pPr lvl="1"/>
+            <a:r>
+              <a:rPr lang="en-US"/>
+              <a:t>Second level</a:t>
+            </a:r>
+          </a:p>
+          <a:p>
+            <a:pPr lvl="2"/>
+            <a:r>
+              <a:rPr lang="en-US"/>
+              <a:t>Third level</a:t>
+            </a:r>
+          </a:p>
+          <a:p>
+            <a:pPr lvl="3"/>
+            <a:r>
+              <a:rPr lang="en-US"/>
+              <a:t>Fourth level</a:t>
+            </a:r>
+          </a:p>
+          <a:p>
+            <a:pPr lvl="4"/>
+            <a:r>
+              <a:rPr lang="en-US"/>
+              <a:t>Fifth level</a:t>
+            </a:r>
+          </a:p>
+        </p:txBody>
+      </p:sp>
+      <p:sp>
+        <p:nvSpPr>
+          <p:cNvPr id="6" name="Footer Placeholder 5"/>
+          <p:cNvSpPr>
+            <a:spLocks noGrp="1"/>
+          </p:cNvSpPr>
+          <p:nvPr>
+            <p:ph type="ftr" sz="quarter" idx="4"/>
+          </p:nvPr>
+        </p:nvSpPr>
+        <p:spPr>
+          <a:xfrm>
+            <a:off x="0" y="8685213"/>
+            <a:ext cx="2971800" cy="458787"/>
+          </a:xfrm>
+          <a:prstGeom prst="rect">
+            <a:avLst/>
+          </a:prstGeom>
+        </p:spPr>
+        <p:txBody>
+          <a:bodyPr vert="horz" lIns="91440" tIns="45720" rIns="91440" bIns="45720" rtlCol="0" anchor="b"/>
+          <a:lstStyle>
+            <a:lvl1pPr algn="l">
+              <a:defRPr sz="1200"/>
+            </a:lvl1pPr>
+          </a:lstStyle>
+          <a:p>
+            <a:endParaRPr lang="en-US"/>
+          </a:p>
+        </p:txBody>
+      </p:sp>
+      <p:sp>
+        <p:nvSpPr>
+          <p:cNvPr id="7" name="Slide Number Placeholder 6"/>
+          <p:cNvSpPr>
+            <a:spLocks noGrp="1"/>
+          </p:cNvSpPr>
+          <p:nvPr>
+            <p:ph type="sldNum" sz="quarter" idx="5"/>
+          </p:nvPr>
+        </p:nvSpPr>
+        <p:spPr>
+          <a:xfrm>
+            <a:off x="3884613" y="8685213"/>
+            <a:ext cx="2971800" cy="458787"/>
+          </a:xfrm>
+          <a:prstGeom prst="rect">
+            <a:avLst/>
+          </a:prstGeom>
+        </p:spPr>
+        <p:txBody>
+          <a:bodyPr vert="horz" lIns="91440" tIns="45720" rIns="91440" bIns="45720" rtlCol="0" anchor="b"/>
+          <a:lstStyle>
+            <a:lvl1pPr algn="r">
+              <a:defRPr sz="1200"/>
+            </a:lvl1pPr>
+          </a:lstStyle>
+          <a:p>
+            <a:fld id="{5E7AAC3B-3B94-4C4B-8F51-A3CDB3469A08}" type="slidenum">
+              <a:rPr lang="en-US" smtClean="0"/>
+              <a:t>‹#›</a:t>
+            </a:fld>
+            <a:endParaRPr lang="en-US"/>
+          </a:p>
+        </p:txBody>
+      </p:sp>
+    </p:spTree>
+    <p:extLst>
+      <p:ext uri="{BB962C8B-B14F-4D97-AF65-F5344CB8AC3E}">
+        <p14:creationId xmlns:p14="http://schemas.microsoft.com/office/powerpoint/2010/main" val="2400573810"/>
+      </p:ext>
+    </p:extLst>
+  </p:cSld>
+  <p:clrMap bg1="lt1" tx1="dk1" bg2="lt2" tx2="dk2" accent1="accent1" accent2="accent2" accent3="accent3" accent4="accent4" accent5="accent5" accent6="accent6" hlink="hlink" folHlink="folHlink"/>
+  <p:notesStyle>
+    <a:lvl1pPr marL="0" algn="l" defTabSz="914400" rtl="0" eaLnBrk="1" latinLnBrk="0" hangingPunct="1">
+      <a:defRPr sz="1200" kern="1200">
+        <a:solidFill>
+          <a:schemeClr val="tx1"/>
+        </a:solidFill>
+        <a:latin typeface="+mn-lt"/>
+        <a:ea typeface="+mn-ea"/>
+        <a:cs typeface="+mn-cs"/>
+      </a:defRPr>
+    </a:lvl1pPr>
+    <a:lvl2pPr marL="457200" algn="l" defTabSz="914400" rtl="0" eaLnBrk="1" latinLnBrk="0" hangingPunct="1">
+      <a:defRPr sz="1200" kern="1200">
+        <a:solidFill>
+          <a:schemeClr val="tx1"/>
+        </a:solidFill>
+        <a:latin typeface="+mn-lt"/>
+        <a:ea typeface="+mn-ea"/>
+        <a:cs typeface="+mn-cs"/>
+      </a:defRPr>
+    </a:lvl2pPr>
+    <a:lvl3pPr marL="914400" algn="l" defTabSz="914400" rtl="0" eaLnBrk="1" latinLnBrk="0" hangingPunct="1">
+      <a:defRPr sz="1200" kern="1200">
+        <a:solidFill>
+          <a:schemeClr val="tx1"/>
+        </a:solidFill>
+        <a:latin typeface="+mn-lt"/>
+        <a:ea typeface="+mn-ea"/>
+        <a:cs typeface="+mn-cs"/>
+      </a:defRPr>
+    </a:lvl3pPr>
+    <a:lvl4pPr marL="1371600" algn="l" defTabSz="914400" rtl="0" eaLnBrk="1" latinLnBrk="0" hangingPunct="1">
+      <a:defRPr sz="1200" kern="1200">
+        <a:solidFill>
+          <a:schemeClr val="tx1"/>
+        </a:solidFill>
+        <a:latin typeface="+mn-lt"/>
+        <a:ea typeface="+mn-ea"/>
+        <a:cs typeface="+mn-cs"/>
+      </a:defRPr>
+    </a:lvl4pPr>
+    <a:lvl5pPr marL="1828800" algn="l" defTabSz="914400" rtl="0" eaLnBrk="1" latinLnBrk="0" hangingPunct="1">
+      <a:defRPr sz="1200" kern="1200">
+        <a:solidFill>
+          <a:schemeClr val="tx1"/>
+        </a:solidFill>
+        <a:latin typeface="+mn-lt"/>
+        <a:ea typeface="+mn-ea"/>
+        <a:cs typeface="+mn-cs"/>
+      </a:defRPr>
+    </a:lvl5pPr>
+    <a:lvl6pPr marL="2286000" algn="l" defTabSz="914400" rtl="0" eaLnBrk="1" latinLnBrk="0" hangingPunct="1">
+      <a:defRPr sz="1200" kern="1200">
+        <a:solidFill>
+          <a:schemeClr val="tx1"/>
+        </a:solidFill>
+        <a:latin typeface="+mn-lt"/>
+        <a:ea typeface="+mn-ea"/>
+        <a:cs typeface="+mn-cs"/>
+      </a:defRPr>
+    </a:lvl6pPr>
+    <a:lvl7pPr marL="2743200" algn="l" defTabSz="914400" rtl="0" eaLnBrk="1" latinLnBrk="0" hangingPunct="1">
+      <a:defRPr sz="1200" kern="1200">
+        <a:solidFill>
+          <a:schemeClr val="tx1"/>
+        </a:solidFill>
+        <a:latin typeface="+mn-lt"/>
+        <a:ea typeface="+mn-ea"/>
+        <a:cs typeface="+mn-cs"/>
+      </a:defRPr>
+    </a:lvl7pPr>
+    <a:lvl8pPr marL="3200400" algn="l" defTabSz="914400" rtl="0" eaLnBrk="1" latinLnBrk="0" hangingPunct="1">
+      <a:defRPr sz="1200" kern="1200">
+        <a:solidFill>
+          <a:schemeClr val="tx1"/>
+        </a:solidFill>
+        <a:latin typeface="+mn-lt"/>
+        <a:ea typeface="+mn-ea"/>
+        <a:cs typeface="+mn-cs"/>
+      </a:defRPr>
+    </a:lvl8pPr>
+    <a:lvl9pPr marL="3657600" algn="l" defTabSz="914400" rtl="0" eaLnBrk="1" latinLnBrk="0" hangingPunct="1">
+      <a:defRPr sz="1200" kern="1200">
+        <a:solidFill>
+          <a:schemeClr val="tx1"/>
+        </a:solidFill>
+        <a:latin typeface="+mn-lt"/>
+        <a:ea typeface="+mn-ea"/>
+        <a:cs typeface="+mn-cs"/>
+      </a:defRPr>
+    </a:lvl9pPr>
+  </p:notesStyle>
+</p:notesMaster>
+</file>
+
+<file path=ppt/notesSlides/notesSlide1.xml><?xml version="1.0" encoding="utf-8"?>
+<p:notes xmlns:a="http://schemas.openxmlformats.org/drawingml/2006/main" xmlns:r="http://schemas.openxmlformats.org/officeDocument/2006/relationships" xmlns:p="http://schemas.openxmlformats.org/presentationml/2006/main">
+  <p:cSld>
+    <p:spTree>
+      <p:nvGrpSpPr>
+        <p:cNvPr id="1" name=""/>
+        <p:cNvGrpSpPr/>
+        <p:nvPr/>
+      </p:nvGrpSpPr>
+      <p:grpSpPr>
+        <a:xfrm>
+          <a:off x="0" y="0"/>
+          <a:ext cx="0" cy="0"/>
+          <a:chOff x="0" y="0"/>
+          <a:chExt cx="0" cy="0"/>
+        </a:xfrm>
+      </p:grpSpPr>
+      <p:sp>
+        <p:nvSpPr>
+          <p:cNvPr id="2" name="Slide Image Placeholder 1"/>
+          <p:cNvSpPr>
+            <a:spLocks noGrp="1" noRot="1" noChangeAspect="1"/>
+          </p:cNvSpPr>
+          <p:nvPr>
+            <p:ph type="sldImg"/>
+          </p:nvPr>
+        </p:nvSpPr>
+        <p:spPr/>
+      </p:sp>
+      <p:sp>
+        <p:nvSpPr>
+          <p:cNvPr id="3" name="Notes Placeholder 2"/>
+          <p:cNvSpPr>
+            <a:spLocks noGrp="1"/>
+          </p:cNvSpPr>
+          <p:nvPr>
+            <p:ph type="body" idx="1"/>
+          </p:nvPr>
+        </p:nvSpPr>
+        <p:spPr/>
+        <p:txBody>
+          <a:bodyPr/>
+          <a:lstStyle/>
+          <a:p>
+            <a:endParaRPr lang="en-US" dirty="0"/>
+          </a:p>
+        </p:txBody>
+      </p:sp>
+      <p:sp>
+        <p:nvSpPr>
+          <p:cNvPr id="4" name="Slide Number Placeholder 3"/>
+          <p:cNvSpPr>
+            <a:spLocks noGrp="1"/>
+          </p:cNvSpPr>
+          <p:nvPr>
+            <p:ph type="sldNum" sz="quarter" idx="5"/>
+          </p:nvPr>
+        </p:nvSpPr>
+        <p:spPr/>
+        <p:txBody>
+          <a:bodyPr/>
+          <a:lstStyle/>
+          <a:p>
+            <a:fld id="{5E7AAC3B-3B94-4C4B-8F51-A3CDB3469A08}" type="slidenum">
+              <a:rPr lang="en-US" smtClean="0"/>
+              <a:t>1</a:t>
+            </a:fld>
+            <a:endParaRPr lang="en-US"/>
+          </a:p>
+        </p:txBody>
+      </p:sp>
+    </p:spTree>
+    <p:extLst>
+      <p:ext uri="{BB962C8B-B14F-4D97-AF65-F5344CB8AC3E}">
+        <p14:creationId xmlns:p14="http://schemas.microsoft.com/office/powerpoint/2010/main" val="2268389729"/>
+      </p:ext>
+    </p:extLst>
+  </p:cSld>
+  <p:clrMapOvr>
+    <a:masterClrMapping/>
+  </p:clrMapOvr>
+</p:notes>
 </file>
 
 <file path=ppt/slideLayouts/slideLayout1.xml><?xml version="1.0" encoding="utf-8"?>
@@ -238,7 +733,7 @@
           <a:p>
             <a:fld id="{03F33DFB-71A7-0742-9BC1-25A0EB210C48}" type="datetimeFigureOut">
               <a:rPr lang="en-US" smtClean="0"/>
-              <a:t>3/10/24</a:t>
+              <a:t>3/12/24</a:t>
             </a:fld>
             <a:endParaRPr lang="en-US"/>
           </a:p>
@@ -408,7 +903,7 @@
           <a:p>
             <a:fld id="{03F33DFB-71A7-0742-9BC1-25A0EB210C48}" type="datetimeFigureOut">
               <a:rPr lang="en-US" smtClean="0"/>
-              <a:t>3/10/24</a:t>
+              <a:t>3/12/24</a:t>
             </a:fld>
             <a:endParaRPr lang="en-US"/>
           </a:p>
@@ -588,7 +1083,7 @@
           <a:p>
             <a:fld id="{03F33DFB-71A7-0742-9BC1-25A0EB210C48}" type="datetimeFigureOut">
               <a:rPr lang="en-US" smtClean="0"/>
-              <a:t>3/10/24</a:t>
+              <a:t>3/12/24</a:t>
             </a:fld>
             <a:endParaRPr lang="en-US"/>
           </a:p>
@@ -758,7 +1253,7 @@
           <a:p>
             <a:fld id="{03F33DFB-71A7-0742-9BC1-25A0EB210C48}" type="datetimeFigureOut">
               <a:rPr lang="en-US" smtClean="0"/>
-              <a:t>3/10/24</a:t>
+              <a:t>3/12/24</a:t>
             </a:fld>
             <a:endParaRPr lang="en-US"/>
           </a:p>
@@ -1002,7 +1497,7 @@
           <a:p>
             <a:fld id="{03F33DFB-71A7-0742-9BC1-25A0EB210C48}" type="datetimeFigureOut">
               <a:rPr lang="en-US" smtClean="0"/>
-              <a:t>3/10/24</a:t>
+              <a:t>3/12/24</a:t>
             </a:fld>
             <a:endParaRPr lang="en-US"/>
           </a:p>
@@ -1234,7 +1729,7 @@
           <a:p>
             <a:fld id="{03F33DFB-71A7-0742-9BC1-25A0EB210C48}" type="datetimeFigureOut">
               <a:rPr lang="en-US" smtClean="0"/>
-              <a:t>3/10/24</a:t>
+              <a:t>3/12/24</a:t>
             </a:fld>
             <a:endParaRPr lang="en-US"/>
           </a:p>
@@ -1601,7 +2096,7 @@
           <a:p>
             <a:fld id="{03F33DFB-71A7-0742-9BC1-25A0EB210C48}" type="datetimeFigureOut">
               <a:rPr lang="en-US" smtClean="0"/>
-              <a:t>3/10/24</a:t>
+              <a:t>3/12/24</a:t>
             </a:fld>
             <a:endParaRPr lang="en-US"/>
           </a:p>
@@ -1719,7 +2214,7 @@
           <a:p>
             <a:fld id="{03F33DFB-71A7-0742-9BC1-25A0EB210C48}" type="datetimeFigureOut">
               <a:rPr lang="en-US" smtClean="0"/>
-              <a:t>3/10/24</a:t>
+              <a:t>3/12/24</a:t>
             </a:fld>
             <a:endParaRPr lang="en-US"/>
           </a:p>
@@ -1814,7 +2309,7 @@
           <a:p>
             <a:fld id="{03F33DFB-71A7-0742-9BC1-25A0EB210C48}" type="datetimeFigureOut">
               <a:rPr lang="en-US" smtClean="0"/>
-              <a:t>3/10/24</a:t>
+              <a:t>3/12/24</a:t>
             </a:fld>
             <a:endParaRPr lang="en-US"/>
           </a:p>
@@ -2091,7 +2586,7 @@
           <a:p>
             <a:fld id="{03F33DFB-71A7-0742-9BC1-25A0EB210C48}" type="datetimeFigureOut">
               <a:rPr lang="en-US" smtClean="0"/>
-              <a:t>3/10/24</a:t>
+              <a:t>3/12/24</a:t>
             </a:fld>
             <a:endParaRPr lang="en-US"/>
           </a:p>
@@ -2348,7 +2843,7 @@
           <a:p>
             <a:fld id="{03F33DFB-71A7-0742-9BC1-25A0EB210C48}" type="datetimeFigureOut">
               <a:rPr lang="en-US" smtClean="0"/>
-              <a:t>3/10/24</a:t>
+              <a:t>3/12/24</a:t>
             </a:fld>
             <a:endParaRPr lang="en-US"/>
           </a:p>
@@ -2561,7 +3056,7 @@
           <a:p>
             <a:fld id="{03F33DFB-71A7-0742-9BC1-25A0EB210C48}" type="datetimeFigureOut">
               <a:rPr lang="en-US" smtClean="0"/>
-              <a:t>3/10/24</a:t>
+              <a:t>3/12/24</a:t>
             </a:fld>
             <a:endParaRPr lang="en-US"/>
           </a:p>
@@ -4572,6 +5067,160 @@
           </a:p>
         </p:txBody>
       </p:sp>
+      <mc:AlternateContent xmlns:mc="http://schemas.openxmlformats.org/markup-compatibility/2006">
+        <mc:Choice xmlns:p14="http://schemas.microsoft.com/office/powerpoint/2010/main" Requires="p14">
+          <p:contentPart p14:bwMode="auto" r:id="rId3">
+            <p14:nvContentPartPr>
+              <p14:cNvPr id="4" name="Ink 3">
+                <a:extLst>
+                  <a:ext uri="{FF2B5EF4-FFF2-40B4-BE49-F238E27FC236}">
+                    <a16:creationId xmlns:a16="http://schemas.microsoft.com/office/drawing/2014/main" id="{3D0AB37A-FE1C-A77E-1969-4A63EC96B2F7}"/>
+                  </a:ext>
+                </a:extLst>
+              </p14:cNvPr>
+              <p14:cNvContentPartPr/>
+              <p14:nvPr/>
+            </p14:nvContentPartPr>
+            <p14:xfrm>
+              <a:off x="99000" y="1275660"/>
+              <a:ext cx="68040" cy="830880"/>
+            </p14:xfrm>
+          </p:contentPart>
+        </mc:Choice>
+        <mc:Fallback>
+          <p:pic>
+            <p:nvPicPr>
+              <p:cNvPr id="4" name="Ink 3">
+                <a:extLst>
+                  <a:ext uri="{FF2B5EF4-FFF2-40B4-BE49-F238E27FC236}">
+                    <a16:creationId xmlns:a16="http://schemas.microsoft.com/office/drawing/2014/main" id="{3D0AB37A-FE1C-A77E-1969-4A63EC96B2F7}"/>
+                  </a:ext>
+                </a:extLst>
+              </p:cNvPr>
+              <p:cNvPicPr/>
+              <p:nvPr/>
+            </p:nvPicPr>
+            <p:blipFill>
+              <a:blip r:embed="rId4"/>
+              <a:stretch>
+                <a:fillRect/>
+              </a:stretch>
+            </p:blipFill>
+            <p:spPr>
+              <a:xfrm>
+                <a:off x="81000" y="1257660"/>
+                <a:ext cx="103680" cy="866520"/>
+              </a:xfrm>
+              <a:prstGeom prst="rect">
+                <a:avLst/>
+              </a:prstGeom>
+            </p:spPr>
+          </p:pic>
+        </mc:Fallback>
+      </mc:AlternateContent>
+      <mc:AlternateContent xmlns:mc="http://schemas.openxmlformats.org/markup-compatibility/2006">
+        <mc:Choice xmlns:p14="http://schemas.microsoft.com/office/powerpoint/2010/main" Requires="p14">
+          <p:contentPart p14:bwMode="auto" r:id="rId5">
+            <p14:nvContentPartPr>
+              <p14:cNvPr id="10" name="Ink 9">
+                <a:extLst>
+                  <a:ext uri="{FF2B5EF4-FFF2-40B4-BE49-F238E27FC236}">
+                    <a16:creationId xmlns:a16="http://schemas.microsoft.com/office/drawing/2014/main" id="{202213A2-65C9-0B2E-F387-381D879FA382}"/>
+                  </a:ext>
+                </a:extLst>
+              </p14:cNvPr>
+              <p14:cNvContentPartPr/>
+              <p14:nvPr/>
+            </p14:nvContentPartPr>
+            <p14:xfrm>
+              <a:off x="126360" y="1211220"/>
+              <a:ext cx="6297480" cy="1343880"/>
+            </p14:xfrm>
+          </p:contentPart>
+        </mc:Choice>
+        <mc:Fallback>
+          <p:pic>
+            <p:nvPicPr>
+              <p:cNvPr id="10" name="Ink 9">
+                <a:extLst>
+                  <a:ext uri="{FF2B5EF4-FFF2-40B4-BE49-F238E27FC236}">
+                    <a16:creationId xmlns:a16="http://schemas.microsoft.com/office/drawing/2014/main" id="{202213A2-65C9-0B2E-F387-381D879FA382}"/>
+                  </a:ext>
+                </a:extLst>
+              </p:cNvPr>
+              <p:cNvPicPr/>
+              <p:nvPr/>
+            </p:nvPicPr>
+            <p:blipFill>
+              <a:blip r:embed="rId6"/>
+              <a:stretch>
+                <a:fillRect/>
+              </a:stretch>
+            </p:blipFill>
+            <p:spPr>
+              <a:xfrm>
+                <a:off x="108360" y="1193580"/>
+                <a:ext cx="6333120" cy="1379520"/>
+              </a:xfrm>
+              <a:prstGeom prst="rect">
+                <a:avLst/>
+              </a:prstGeom>
+            </p:spPr>
+          </p:pic>
+        </mc:Fallback>
+      </mc:AlternateContent>
+      <p:sp>
+        <p:nvSpPr>
+          <p:cNvPr id="19" name="Rectangle 18">
+            <a:extLst>
+              <a:ext uri="{FF2B5EF4-FFF2-40B4-BE49-F238E27FC236}">
+                <a16:creationId xmlns:a16="http://schemas.microsoft.com/office/drawing/2014/main" id="{89204E79-26DE-DDE9-8D51-D779F4746E1B}"/>
+              </a:ext>
+            </a:extLst>
+          </p:cNvPr>
+          <p:cNvSpPr/>
+          <p:nvPr/>
+        </p:nvSpPr>
+        <p:spPr>
+          <a:xfrm>
+            <a:off x="0" y="2343150"/>
+            <a:ext cx="6837399" cy="4978400"/>
+          </a:xfrm>
+          <a:prstGeom prst="rect">
+            <a:avLst/>
+          </a:prstGeom>
+          <a:noFill/>
+          <a:ln>
+            <a:solidFill>
+              <a:schemeClr val="tx1"/>
+            </a:solidFill>
+          </a:ln>
+        </p:spPr>
+        <p:style>
+          <a:lnRef idx="2">
+            <a:schemeClr val="accent1">
+              <a:shade val="15000"/>
+            </a:schemeClr>
+          </a:lnRef>
+          <a:fillRef idx="1">
+            <a:schemeClr val="accent1"/>
+          </a:fillRef>
+          <a:effectRef idx="0">
+            <a:schemeClr val="accent1"/>
+          </a:effectRef>
+          <a:fontRef idx="minor">
+            <a:schemeClr val="lt1"/>
+          </a:fontRef>
+        </p:style>
+        <p:txBody>
+          <a:bodyPr rtlCol="0" anchor="ctr"/>
+          <a:lstStyle/>
+          <a:p>
+            <a:pPr algn="ctr"/>
+            <a:endParaRPr lang="en-US" dirty="0"/>
+          </a:p>
+        </p:txBody>
+      </p:sp>
     </p:spTree>
     <p:extLst>
       <p:ext uri="{BB962C8B-B14F-4D97-AF65-F5344CB8AC3E}">
@@ -4844,4 +5493,319 @@
     </a:ext>
   </a:extLst>
 </a:theme>
+</file>
+
+<file path=ppt/theme/theme2.xml><?xml version="1.0" encoding="utf-8"?>
+<a:theme xmlns:a="http://schemas.openxmlformats.org/drawingml/2006/main" name="Office Theme">
+  <a:themeElements>
+    <a:clrScheme name="Office">
+      <a:dk1>
+        <a:sysClr val="windowText" lastClr="000000"/>
+      </a:dk1>
+      <a:lt1>
+        <a:sysClr val="window" lastClr="FFFFFF"/>
+      </a:lt1>
+      <a:dk2>
+        <a:srgbClr val="0E2841"/>
+      </a:dk2>
+      <a:lt2>
+        <a:srgbClr val="E8E8E8"/>
+      </a:lt2>
+      <a:accent1>
+        <a:srgbClr val="156082"/>
+      </a:accent1>
+      <a:accent2>
+        <a:srgbClr val="E97132"/>
+      </a:accent2>
+      <a:accent3>
+        <a:srgbClr val="196B24"/>
+      </a:accent3>
+      <a:accent4>
+        <a:srgbClr val="0F9ED5"/>
+      </a:accent4>
+      <a:accent5>
+        <a:srgbClr val="A02B93"/>
+      </a:accent5>
+      <a:accent6>
+        <a:srgbClr val="4EA72E"/>
+      </a:accent6>
+      <a:hlink>
+        <a:srgbClr val="467886"/>
+      </a:hlink>
+      <a:folHlink>
+        <a:srgbClr val="96607D"/>
+      </a:folHlink>
+    </a:clrScheme>
+    <a:fontScheme name="Office">
+      <a:majorFont>
+        <a:latin typeface="Aptos Display" panose="02110004020202020204"/>
+        <a:ea typeface=""/>
+        <a:cs typeface=""/>
+        <a:font script="Jpan" typeface="游ゴシック Light"/>
+        <a:font script="Hang" typeface="맑은 고딕"/>
+        <a:font script="Hans" typeface="等线 Light"/>
+        <a:font script="Hant" typeface="新細明體"/>
+        <a:font script="Arab" typeface="Times New Roman"/>
+        <a:font script="Hebr" typeface="Times New Roman"/>
+        <a:font script="Thai" typeface="Angsana New"/>
+        <a:font script="Ethi" typeface="Nyala"/>
+        <a:font script="Beng" typeface="Vrinda"/>
+        <a:font script="Gujr" typeface="Shruti"/>
+        <a:font script="Khmr" typeface="MoolBoran"/>
+        <a:font script="Knda" typeface="Tunga"/>
+        <a:font script="Guru" typeface="Raavi"/>
+        <a:font script="Cans" typeface="Euphemia"/>
+        <a:font script="Cher" typeface="Plantagenet Cherokee"/>
+        <a:font script="Yiii" typeface="Microsoft Yi Baiti"/>
+        <a:font script="Tibt" typeface="Microsoft Himalaya"/>
+        <a:font script="Thaa" typeface="MV Boli"/>
+        <a:font script="Deva" typeface="Mangal"/>
+        <a:font script="Telu" typeface="Gautami"/>
+        <a:font script="Taml" typeface="Latha"/>
+        <a:font script="Syrc" typeface="Estrangelo Edessa"/>
+        <a:font script="Orya" typeface="Kalinga"/>
+        <a:font script="Mlym" typeface="Kartika"/>
+        <a:font script="Laoo" typeface="DokChampa"/>
+        <a:font script="Sinh" typeface="Iskoola Pota"/>
+        <a:font script="Mong" typeface="Mongolian Baiti"/>
+        <a:font script="Viet" typeface="Times New Roman"/>
+        <a:font script="Uigh" typeface="Microsoft Uighur"/>
+        <a:font script="Geor" typeface="Sylfaen"/>
+        <a:font script="Armn" typeface="Arial"/>
+        <a:font script="Bugi" typeface="Leelawadee UI"/>
+        <a:font script="Bopo" typeface="Microsoft JhengHei"/>
+        <a:font script="Java" typeface="Javanese Text"/>
+        <a:font script="Lisu" typeface="Segoe UI"/>
+        <a:font script="Mymr" typeface="Myanmar Text"/>
+        <a:font script="Nkoo" typeface="Ebrima"/>
+        <a:font script="Olck" typeface="Nirmala UI"/>
+        <a:font script="Osma" typeface="Ebrima"/>
+        <a:font script="Phag" typeface="Phagspa"/>
+        <a:font script="Syrn" typeface="Estrangelo Edessa"/>
+        <a:font script="Syrj" typeface="Estrangelo Edessa"/>
+        <a:font script="Syre" typeface="Estrangelo Edessa"/>
+        <a:font script="Sora" typeface="Nirmala UI"/>
+        <a:font script="Tale" typeface="Microsoft Tai Le"/>
+        <a:font script="Talu" typeface="Microsoft New Tai Lue"/>
+        <a:font script="Tfng" typeface="Ebrima"/>
+      </a:majorFont>
+      <a:minorFont>
+        <a:latin typeface="Aptos" panose="02110004020202020204"/>
+        <a:ea typeface=""/>
+        <a:cs typeface=""/>
+        <a:font script="Jpan" typeface="游ゴシック"/>
+        <a:font script="Hang" typeface="맑은 고딕"/>
+        <a:font script="Hans" typeface="等线"/>
+        <a:font script="Hant" typeface="新細明體"/>
+        <a:font script="Arab" typeface="Arial"/>
+        <a:font script="Hebr" typeface="Arial"/>
+        <a:font script="Thai" typeface="Cordia New"/>
+        <a:font script="Ethi" typeface="Nyala"/>
+        <a:font script="Beng" typeface="Vrinda"/>
+        <a:font script="Gujr" typeface="Shruti"/>
+        <a:font script="Khmr" typeface="DaunPenh"/>
+        <a:font script="Knda" typeface="Tunga"/>
+        <a:font script="Guru" typeface="Raavi"/>
+        <a:font script="Cans" typeface="Euphemia"/>
+        <a:font script="Cher" typeface="Plantagenet Cherokee"/>
+        <a:font script="Yiii" typeface="Microsoft Yi Baiti"/>
+        <a:font script="Tibt" typeface="Microsoft Himalaya"/>
+        <a:font script="Thaa" typeface="MV Boli"/>
+        <a:font script="Deva" typeface="Mangal"/>
+        <a:font script="Telu" typeface="Gautami"/>
+        <a:font script="Taml" typeface="Latha"/>
+        <a:font script="Syrc" typeface="Estrangelo Edessa"/>
+        <a:font script="Orya" typeface="Kalinga"/>
+        <a:font script="Mlym" typeface="Kartika"/>
+        <a:font script="Laoo" typeface="DokChampa"/>
+        <a:font script="Sinh" typeface="Iskoola Pota"/>
+        <a:font script="Mong" typeface="Mongolian Baiti"/>
+        <a:font script="Viet" typeface="Arial"/>
+        <a:font script="Uigh" typeface="Microsoft Uighur"/>
+        <a:font script="Geor" typeface="Sylfaen"/>
+        <a:font script="Armn" typeface="Arial"/>
+        <a:font script="Bugi" typeface="Leelawadee UI"/>
+        <a:font script="Bopo" typeface="Microsoft JhengHei"/>
+        <a:font script="Java" typeface="Javanese Text"/>
+        <a:font script="Lisu" typeface="Segoe UI"/>
+        <a:font script="Mymr" typeface="Myanmar Text"/>
+        <a:font script="Nkoo" typeface="Ebrima"/>
+        <a:font script="Olck" typeface="Nirmala UI"/>
+        <a:font script="Osma" typeface="Ebrima"/>
+        <a:font script="Phag" typeface="Phagspa"/>
+        <a:font script="Syrn" typeface="Estrangelo Edessa"/>
+        <a:font script="Syrj" typeface="Estrangelo Edessa"/>
+        <a:font script="Syre" typeface="Estrangelo Edessa"/>
+        <a:font script="Sora" typeface="Nirmala UI"/>
+        <a:font script="Tale" typeface="Microsoft Tai Le"/>
+        <a:font script="Talu" typeface="Microsoft New Tai Lue"/>
+        <a:font script="Tfng" typeface="Ebrima"/>
+      </a:minorFont>
+    </a:fontScheme>
+    <a:fmtScheme name="Office">
+      <a:fillStyleLst>
+        <a:solidFill>
+          <a:schemeClr val="phClr"/>
+        </a:solidFill>
+        <a:gradFill rotWithShape="1">
+          <a:gsLst>
+            <a:gs pos="0">
+              <a:schemeClr val="phClr">
+                <a:lumMod val="110000"/>
+                <a:satMod val="105000"/>
+                <a:tint val="67000"/>
+              </a:schemeClr>
+            </a:gs>
+            <a:gs pos="50000">
+              <a:schemeClr val="phClr">
+                <a:lumMod val="105000"/>
+                <a:satMod val="103000"/>
+                <a:tint val="73000"/>
+              </a:schemeClr>
+            </a:gs>
+            <a:gs pos="100000">
+              <a:schemeClr val="phClr">
+                <a:lumMod val="105000"/>
+                <a:satMod val="109000"/>
+                <a:tint val="81000"/>
+              </a:schemeClr>
+            </a:gs>
+          </a:gsLst>
+          <a:lin ang="5400000" scaled="0"/>
+        </a:gradFill>
+        <a:gradFill rotWithShape="1">
+          <a:gsLst>
+            <a:gs pos="0">
+              <a:schemeClr val="phClr">
+                <a:satMod val="103000"/>
+                <a:lumMod val="102000"/>
+                <a:tint val="94000"/>
+              </a:schemeClr>
+            </a:gs>
+            <a:gs pos="50000">
+              <a:schemeClr val="phClr">
+                <a:satMod val="110000"/>
+                <a:lumMod val="100000"/>
+                <a:shade val="100000"/>
+              </a:schemeClr>
+            </a:gs>
+            <a:gs pos="100000">
+              <a:schemeClr val="phClr">
+                <a:lumMod val="99000"/>
+                <a:satMod val="120000"/>
+                <a:shade val="78000"/>
+              </a:schemeClr>
+            </a:gs>
+          </a:gsLst>
+          <a:lin ang="5400000" scaled="0"/>
+        </a:gradFill>
+      </a:fillStyleLst>
+      <a:lnStyleLst>
+        <a:ln w="12700" cap="flat" cmpd="sng" algn="ctr">
+          <a:solidFill>
+            <a:schemeClr val="phClr"/>
+          </a:solidFill>
+          <a:prstDash val="solid"/>
+          <a:miter lim="800000"/>
+        </a:ln>
+        <a:ln w="19050" cap="flat" cmpd="sng" algn="ctr">
+          <a:solidFill>
+            <a:schemeClr val="phClr"/>
+          </a:solidFill>
+          <a:prstDash val="solid"/>
+          <a:miter lim="800000"/>
+        </a:ln>
+        <a:ln w="25400" cap="flat" cmpd="sng" algn="ctr">
+          <a:solidFill>
+            <a:schemeClr val="phClr"/>
+          </a:solidFill>
+          <a:prstDash val="solid"/>
+          <a:miter lim="800000"/>
+        </a:ln>
+      </a:lnStyleLst>
+      <a:effectStyleLst>
+        <a:effectStyle>
+          <a:effectLst/>
+        </a:effectStyle>
+        <a:effectStyle>
+          <a:effectLst/>
+        </a:effectStyle>
+        <a:effectStyle>
+          <a:effectLst>
+            <a:outerShdw blurRad="57150" dist="19050" dir="5400000" algn="ctr" rotWithShape="0">
+              <a:srgbClr val="000000">
+                <a:alpha val="63000"/>
+              </a:srgbClr>
+            </a:outerShdw>
+          </a:effectLst>
+        </a:effectStyle>
+      </a:effectStyleLst>
+      <a:bgFillStyleLst>
+        <a:solidFill>
+          <a:schemeClr val="phClr"/>
+        </a:solidFill>
+        <a:solidFill>
+          <a:schemeClr val="phClr">
+            <a:tint val="95000"/>
+            <a:satMod val="170000"/>
+          </a:schemeClr>
+        </a:solidFill>
+        <a:gradFill rotWithShape="1">
+          <a:gsLst>
+            <a:gs pos="0">
+              <a:schemeClr val="phClr">
+                <a:tint val="93000"/>
+                <a:satMod val="150000"/>
+                <a:shade val="98000"/>
+                <a:lumMod val="102000"/>
+              </a:schemeClr>
+            </a:gs>
+            <a:gs pos="50000">
+              <a:schemeClr val="phClr">
+                <a:tint val="98000"/>
+                <a:satMod val="130000"/>
+                <a:shade val="90000"/>
+                <a:lumMod val="103000"/>
+              </a:schemeClr>
+            </a:gs>
+            <a:gs pos="100000">
+              <a:schemeClr val="phClr">
+                <a:shade val="63000"/>
+                <a:satMod val="120000"/>
+              </a:schemeClr>
+            </a:gs>
+          </a:gsLst>
+          <a:lin ang="5400000" scaled="0"/>
+        </a:gradFill>
+      </a:bgFillStyleLst>
+    </a:fmtScheme>
+  </a:themeElements>
+  <a:objectDefaults>
+    <a:lnDef>
+      <a:spPr/>
+      <a:bodyPr/>
+      <a:lstStyle/>
+      <a:style>
+        <a:lnRef idx="2">
+          <a:schemeClr val="accent1"/>
+        </a:lnRef>
+        <a:fillRef idx="0">
+          <a:schemeClr val="accent1"/>
+        </a:fillRef>
+        <a:effectRef idx="1">
+          <a:schemeClr val="accent1"/>
+        </a:effectRef>
+        <a:fontRef idx="minor">
+          <a:schemeClr val="tx1"/>
+        </a:fontRef>
+      </a:style>
+    </a:lnDef>
+  </a:objectDefaults>
+  <a:extraClrSchemeLst/>
+  <a:extLst>
+    <a:ext uri="{05A4C25C-085E-4340-85A3-A5531E510DB2}">
+      <thm15:themeFamily xmlns:thm15="http://schemas.microsoft.com/office/thememl/2012/main" name="Office Theme" id="{2E142A2C-CD16-42D6-873A-C26D2A0506FA}" vid="{1BDDFF52-6CD6-40A5-AB3C-68EB2F1E4D0A}"/>
+    </a:ext>
+  </a:extLst>
+</a:theme>
 </file>
</xml_diff>